<commit_message>
📝 Add 1Password to WebAuthn supporters
</commit_message>
<xml_diff>
--- a/WebAuthn.pptx
+++ b/WebAuthn.pptx
@@ -967,7 +967,7 @@
       </p:grpSpPr>
       <p:sp>
         <p:nvSpPr>
-          <p:cNvPr id="224" name="Shape 224"/>
+          <p:cNvPr id="225" name="Shape 225"/>
           <p:cNvSpPr/>
           <p:nvPr>
             <p:ph type="sldImg"/>
@@ -988,7 +988,7 @@
       </p:sp>
       <p:sp>
         <p:nvSpPr>
-          <p:cNvPr id="225" name="Shape 225"/>
+          <p:cNvPr id="226" name="Shape 226"/>
           <p:cNvSpPr/>
           <p:nvPr>
             <p:ph type="body" sz="quarter" idx="1"/>
@@ -1011,7 +1011,13 @@
           <a:p>
             <a:pPr/>
             <a:r>
-              <a:t>Pour l’instant c’est un peu calme, seul Dropbox a annoncé le support de WebAuthn en mai (comme second facteur).</a:t>
+              <a:t>Pour l’instant c’est un peu calme, Dropbox a été le premier a annoncé le support de WebAuthn en mai 2018 (comme second facteur).</a:t>
+            </a:r>
+          </a:p>
+          <a:p>
+            <a:pPr/>
+            <a:r>
+              <a:t>1Password a ajouté le support d’un second facteur d’authentification physique en utilisant WebAuthn en juin 2019.</a:t>
             </a:r>
           </a:p>
           <a:p>
@@ -1053,7 +1059,7 @@
       </p:grpSpPr>
       <p:sp>
         <p:nvSpPr>
-          <p:cNvPr id="231" name="Shape 231"/>
+          <p:cNvPr id="232" name="Shape 232"/>
           <p:cNvSpPr/>
           <p:nvPr>
             <p:ph type="sldImg"/>
@@ -1074,7 +1080,7 @@
       </p:sp>
       <p:sp>
         <p:nvSpPr>
-          <p:cNvPr id="232" name="Shape 232"/>
+          <p:cNvPr id="233" name="Shape 233"/>
           <p:cNvSpPr/>
           <p:nvPr>
             <p:ph type="body" sz="quarter" idx="1"/>
@@ -1135,7 +1141,7 @@
       </p:grpSpPr>
       <p:sp>
         <p:nvSpPr>
-          <p:cNvPr id="235" name="Shape 235"/>
+          <p:cNvPr id="236" name="Shape 236"/>
           <p:cNvSpPr/>
           <p:nvPr>
             <p:ph type="sldImg"/>
@@ -1156,7 +1162,7 @@
       </p:sp>
       <p:sp>
         <p:nvSpPr>
-          <p:cNvPr id="236" name="Shape 236"/>
+          <p:cNvPr id="237" name="Shape 237"/>
           <p:cNvSpPr/>
           <p:nvPr>
             <p:ph type="body" sz="quarter" idx="1"/>
@@ -1235,7 +1241,7 @@
       </p:grpSpPr>
       <p:sp>
         <p:nvSpPr>
-          <p:cNvPr id="239" name="Shape 239"/>
+          <p:cNvPr id="240" name="Shape 240"/>
           <p:cNvSpPr/>
           <p:nvPr>
             <p:ph type="sldImg"/>
@@ -1256,7 +1262,7 @@
       </p:sp>
       <p:sp>
         <p:nvSpPr>
-          <p:cNvPr id="240" name="Shape 240"/>
+          <p:cNvPr id="241" name="Shape 241"/>
           <p:cNvSpPr/>
           <p:nvPr>
             <p:ph type="body" sz="quarter" idx="1"/>
@@ -1326,7 +1332,7 @@
       </p:grpSpPr>
       <p:sp>
         <p:nvSpPr>
-          <p:cNvPr id="243" name="Shape 243"/>
+          <p:cNvPr id="244" name="Shape 244"/>
           <p:cNvSpPr/>
           <p:nvPr>
             <p:ph type="sldImg"/>
@@ -1347,7 +1353,7 @@
       </p:sp>
       <p:sp>
         <p:nvSpPr>
-          <p:cNvPr id="244" name="Shape 244"/>
+          <p:cNvPr id="245" name="Shape 245"/>
           <p:cNvSpPr/>
           <p:nvPr>
             <p:ph type="body" sz="quarter" idx="1"/>
@@ -1396,7 +1402,7 @@
       </p:grpSpPr>
       <p:sp>
         <p:nvSpPr>
-          <p:cNvPr id="247" name="Shape 247"/>
+          <p:cNvPr id="248" name="Shape 248"/>
           <p:cNvSpPr/>
           <p:nvPr>
             <p:ph type="sldImg"/>
@@ -1417,7 +1423,7 @@
       </p:sp>
       <p:sp>
         <p:nvSpPr>
-          <p:cNvPr id="248" name="Shape 248"/>
+          <p:cNvPr id="249" name="Shape 249"/>
           <p:cNvSpPr/>
           <p:nvPr>
             <p:ph type="body" sz="quarter" idx="1"/>
@@ -1671,7 +1677,7 @@
       </p:grpSpPr>
       <p:sp>
         <p:nvSpPr>
-          <p:cNvPr id="252" name="Shape 252"/>
+          <p:cNvPr id="253" name="Shape 253"/>
           <p:cNvSpPr/>
           <p:nvPr>
             <p:ph type="sldImg"/>
@@ -1692,7 +1698,7 @@
       </p:sp>
       <p:sp>
         <p:nvSpPr>
-          <p:cNvPr id="253" name="Shape 253"/>
+          <p:cNvPr id="254" name="Shape 254"/>
           <p:cNvSpPr/>
           <p:nvPr>
             <p:ph type="body" sz="quarter" idx="1"/>
@@ -1747,7 +1753,7 @@
       </p:grpSpPr>
       <p:sp>
         <p:nvSpPr>
-          <p:cNvPr id="256" name="Shape 256"/>
+          <p:cNvPr id="257" name="Shape 257"/>
           <p:cNvSpPr/>
           <p:nvPr>
             <p:ph type="sldImg"/>
@@ -1768,7 +1774,7 @@
       </p:sp>
       <p:sp>
         <p:nvSpPr>
-          <p:cNvPr id="257" name="Shape 257"/>
+          <p:cNvPr id="258" name="Shape 258"/>
           <p:cNvSpPr/>
           <p:nvPr>
             <p:ph type="body" sz="quarter" idx="1"/>
@@ -3050,8 +3056,8 @@
         </p:nvSpPr>
         <p:spPr>
           <a:xfrm>
-            <a:off x="6503154" y="0"/>
-            <a:ext cx="6502401" cy="4864100"/>
+            <a:off x="5463161" y="-90805"/>
+            <a:ext cx="8585201" cy="5043805"/>
           </a:xfrm>
           <a:prstGeom prst="rect">
             <a:avLst/>
@@ -3077,8 +3083,8 @@
         </p:nvSpPr>
         <p:spPr>
           <a:xfrm>
-            <a:off x="6502400" y="4902200"/>
-            <a:ext cx="6502400" cy="4864100"/>
+            <a:off x="5918717" y="4660900"/>
+            <a:ext cx="7669766" cy="5219700"/>
           </a:xfrm>
           <a:prstGeom prst="rect">
             <a:avLst/>
@@ -3104,8 +3110,8 @@
         </p:nvSpPr>
         <p:spPr>
           <a:xfrm>
-            <a:off x="0" y="0"/>
-            <a:ext cx="6468534" cy="9753600"/>
+            <a:off x="-1016000" y="-12700"/>
+            <a:ext cx="8860898" cy="9779000"/>
           </a:xfrm>
           <a:prstGeom prst="rect">
             <a:avLst/>
@@ -3554,8 +3560,8 @@
         </p:nvSpPr>
         <p:spPr>
           <a:xfrm>
-            <a:off x="0" y="0"/>
-            <a:ext cx="5486400" cy="9753600"/>
+            <a:off x="-1016000" y="-12700"/>
+            <a:ext cx="8860898" cy="9779000"/>
           </a:xfrm>
           <a:prstGeom prst="rect">
             <a:avLst/>
@@ -3685,8 +3691,8 @@
         </p:nvSpPr>
         <p:spPr>
           <a:xfrm>
-            <a:off x="0" y="0"/>
-            <a:ext cx="13004800" cy="9753600"/>
+            <a:off x="-914400" y="-12700"/>
+            <a:ext cx="14814645" cy="9779000"/>
           </a:xfrm>
           <a:prstGeom prst="rect">
             <a:avLst/>
@@ -3870,8 +3876,8 @@
         </p:nvSpPr>
         <p:spPr>
           <a:xfrm>
-            <a:off x="0" y="0"/>
-            <a:ext cx="13004800" cy="9753600"/>
+            <a:off x="-914400" y="-12700"/>
+            <a:ext cx="14814645" cy="9779000"/>
           </a:xfrm>
           <a:prstGeom prst="rect">
             <a:avLst/>
@@ -4621,8 +4627,8 @@
         </p:nvSpPr>
         <p:spPr>
           <a:xfrm>
-            <a:off x="0" y="0"/>
-            <a:ext cx="5486400" cy="9753600"/>
+            <a:off x="-1016000" y="-12700"/>
+            <a:ext cx="8860898" cy="9779000"/>
           </a:xfrm>
           <a:prstGeom prst="rect">
             <a:avLst/>
@@ -5472,13 +5478,13 @@
           <p:cNvPr id="92" name="Image"/>
           <p:cNvSpPr/>
           <p:nvPr>
-            <p:ph type="pic" sz="half" idx="14"/>
+            <p:ph type="pic" idx="14"/>
           </p:nvPr>
         </p:nvSpPr>
         <p:spPr>
           <a:xfrm>
-            <a:off x="7112000" y="1536700"/>
-            <a:ext cx="5486400" cy="7797800"/>
+            <a:off x="6665377" y="1219200"/>
+            <a:ext cx="7445457" cy="8216900"/>
           </a:xfrm>
           <a:prstGeom prst="rect">
             <a:avLst/>
@@ -5893,9 +5899,6 @@
         <a:buNone/>
         <a:tabLst/>
         <a:defRPr b="0" baseline="0" cap="all" i="0" spc="0" strike="noStrike" sz="6000" u="none">
-          <a:ln>
-            <a:noFill/>
-          </a:ln>
           <a:solidFill>
             <a:schemeClr val="accent1"/>
           </a:solidFill>
@@ -5922,9 +5925,6 @@
         <a:buNone/>
         <a:tabLst/>
         <a:defRPr b="0" baseline="0" cap="all" i="0" spc="0" strike="noStrike" sz="6000" u="none">
-          <a:ln>
-            <a:noFill/>
-          </a:ln>
           <a:solidFill>
             <a:schemeClr val="accent1"/>
           </a:solidFill>
@@ -5951,9 +5951,6 @@
         <a:buNone/>
         <a:tabLst/>
         <a:defRPr b="0" baseline="0" cap="all" i="0" spc="0" strike="noStrike" sz="6000" u="none">
-          <a:ln>
-            <a:noFill/>
-          </a:ln>
           <a:solidFill>
             <a:schemeClr val="accent1"/>
           </a:solidFill>
@@ -5980,9 +5977,6 @@
         <a:buNone/>
         <a:tabLst/>
         <a:defRPr b="0" baseline="0" cap="all" i="0" spc="0" strike="noStrike" sz="6000" u="none">
-          <a:ln>
-            <a:noFill/>
-          </a:ln>
           <a:solidFill>
             <a:schemeClr val="accent1"/>
           </a:solidFill>
@@ -6009,9 +6003,6 @@
         <a:buNone/>
         <a:tabLst/>
         <a:defRPr b="0" baseline="0" cap="all" i="0" spc="0" strike="noStrike" sz="6000" u="none">
-          <a:ln>
-            <a:noFill/>
-          </a:ln>
           <a:solidFill>
             <a:schemeClr val="accent1"/>
           </a:solidFill>
@@ -6038,9 +6029,6 @@
         <a:buNone/>
         <a:tabLst/>
         <a:defRPr b="0" baseline="0" cap="all" i="0" spc="0" strike="noStrike" sz="6000" u="none">
-          <a:ln>
-            <a:noFill/>
-          </a:ln>
           <a:solidFill>
             <a:schemeClr val="accent1"/>
           </a:solidFill>
@@ -6067,9 +6055,6 @@
         <a:buNone/>
         <a:tabLst/>
         <a:defRPr b="0" baseline="0" cap="all" i="0" spc="0" strike="noStrike" sz="6000" u="none">
-          <a:ln>
-            <a:noFill/>
-          </a:ln>
           <a:solidFill>
             <a:schemeClr val="accent1"/>
           </a:solidFill>
@@ -6096,9 +6081,6 @@
         <a:buNone/>
         <a:tabLst/>
         <a:defRPr b="0" baseline="0" cap="all" i="0" spc="0" strike="noStrike" sz="6000" u="none">
-          <a:ln>
-            <a:noFill/>
-          </a:ln>
           <a:solidFill>
             <a:schemeClr val="accent1"/>
           </a:solidFill>
@@ -6125,9 +6107,6 @@
         <a:buNone/>
         <a:tabLst/>
         <a:defRPr b="0" baseline="0" cap="all" i="0" spc="0" strike="noStrike" sz="6000" u="none">
-          <a:ln>
-            <a:noFill/>
-          </a:ln>
           <a:solidFill>
             <a:schemeClr val="accent1"/>
           </a:solidFill>
@@ -6160,9 +6139,6 @@
         <a:buChar char="‣"/>
         <a:tabLst/>
         <a:defRPr b="0" baseline="0" cap="none" i="0" spc="0" strike="noStrike" sz="3400" u="none">
-          <a:ln>
-            <a:noFill/>
-          </a:ln>
           <a:solidFill>
             <a:srgbClr val="838787"/>
           </a:solidFill>
@@ -6193,9 +6169,6 @@
         <a:buChar char="‣"/>
         <a:tabLst/>
         <a:defRPr b="0" baseline="0" cap="none" i="0" spc="0" strike="noStrike" sz="3400" u="none">
-          <a:ln>
-            <a:noFill/>
-          </a:ln>
           <a:solidFill>
             <a:srgbClr val="838787"/>
           </a:solidFill>
@@ -6226,9 +6199,6 @@
         <a:buChar char="‣"/>
         <a:tabLst/>
         <a:defRPr b="0" baseline="0" cap="none" i="0" spc="0" strike="noStrike" sz="3400" u="none">
-          <a:ln>
-            <a:noFill/>
-          </a:ln>
           <a:solidFill>
             <a:srgbClr val="838787"/>
           </a:solidFill>
@@ -6259,9 +6229,6 @@
         <a:buChar char="‣"/>
         <a:tabLst/>
         <a:defRPr b="0" baseline="0" cap="none" i="0" spc="0" strike="noStrike" sz="3400" u="none">
-          <a:ln>
-            <a:noFill/>
-          </a:ln>
           <a:solidFill>
             <a:srgbClr val="838787"/>
           </a:solidFill>
@@ -6292,9 +6259,6 @@
         <a:buChar char="‣"/>
         <a:tabLst/>
         <a:defRPr b="0" baseline="0" cap="none" i="0" spc="0" strike="noStrike" sz="3400" u="none">
-          <a:ln>
-            <a:noFill/>
-          </a:ln>
           <a:solidFill>
             <a:srgbClr val="838787"/>
           </a:solidFill>
@@ -6325,9 +6289,6 @@
         <a:buChar char="‣"/>
         <a:tabLst/>
         <a:defRPr b="0" baseline="0" cap="none" i="0" spc="0" strike="noStrike" sz="3400" u="none">
-          <a:ln>
-            <a:noFill/>
-          </a:ln>
           <a:solidFill>
             <a:srgbClr val="838787"/>
           </a:solidFill>
@@ -6358,9 +6319,6 @@
         <a:buChar char="‣"/>
         <a:tabLst/>
         <a:defRPr b="0" baseline="0" cap="none" i="0" spc="0" strike="noStrike" sz="3400" u="none">
-          <a:ln>
-            <a:noFill/>
-          </a:ln>
           <a:solidFill>
             <a:srgbClr val="838787"/>
           </a:solidFill>
@@ -6391,9 +6349,6 @@
         <a:buChar char="‣"/>
         <a:tabLst/>
         <a:defRPr b="0" baseline="0" cap="none" i="0" spc="0" strike="noStrike" sz="3400" u="none">
-          <a:ln>
-            <a:noFill/>
-          </a:ln>
           <a:solidFill>
             <a:srgbClr val="838787"/>
           </a:solidFill>
@@ -6424,9 +6379,6 @@
         <a:buChar char="‣"/>
         <a:tabLst/>
         <a:defRPr b="0" baseline="0" cap="none" i="0" spc="0" strike="noStrike" sz="3400" u="none">
-          <a:ln>
-            <a:noFill/>
-          </a:ln>
           <a:solidFill>
             <a:srgbClr val="838787"/>
           </a:solidFill>
@@ -6455,9 +6407,6 @@
         <a:buNone/>
         <a:tabLst/>
         <a:defRPr b="0" baseline="0" cap="none" i="0" spc="0" strike="noStrike" sz="2400" u="none">
-          <a:ln>
-            <a:noFill/>
-          </a:ln>
           <a:solidFill>
             <a:schemeClr val="tx1"/>
           </a:solidFill>
@@ -6484,9 +6433,6 @@
         <a:buNone/>
         <a:tabLst/>
         <a:defRPr b="0" baseline="0" cap="none" i="0" spc="0" strike="noStrike" sz="2400" u="none">
-          <a:ln>
-            <a:noFill/>
-          </a:ln>
           <a:solidFill>
             <a:schemeClr val="tx1"/>
           </a:solidFill>
@@ -6513,9 +6459,6 @@
         <a:buNone/>
         <a:tabLst/>
         <a:defRPr b="0" baseline="0" cap="none" i="0" spc="0" strike="noStrike" sz="2400" u="none">
-          <a:ln>
-            <a:noFill/>
-          </a:ln>
           <a:solidFill>
             <a:schemeClr val="tx1"/>
           </a:solidFill>
@@ -6542,9 +6485,6 @@
         <a:buNone/>
         <a:tabLst/>
         <a:defRPr b="0" baseline="0" cap="none" i="0" spc="0" strike="noStrike" sz="2400" u="none">
-          <a:ln>
-            <a:noFill/>
-          </a:ln>
           <a:solidFill>
             <a:schemeClr val="tx1"/>
           </a:solidFill>
@@ -6571,9 +6511,6 @@
         <a:buNone/>
         <a:tabLst/>
         <a:defRPr b="0" baseline="0" cap="none" i="0" spc="0" strike="noStrike" sz="2400" u="none">
-          <a:ln>
-            <a:noFill/>
-          </a:ln>
           <a:solidFill>
             <a:schemeClr val="tx1"/>
           </a:solidFill>
@@ -6600,9 +6537,6 @@
         <a:buNone/>
         <a:tabLst/>
         <a:defRPr b="0" baseline="0" cap="none" i="0" spc="0" strike="noStrike" sz="2400" u="none">
-          <a:ln>
-            <a:noFill/>
-          </a:ln>
           <a:solidFill>
             <a:schemeClr val="tx1"/>
           </a:solidFill>
@@ -6629,9 +6563,6 @@
         <a:buNone/>
         <a:tabLst/>
         <a:defRPr b="0" baseline="0" cap="none" i="0" spc="0" strike="noStrike" sz="2400" u="none">
-          <a:ln>
-            <a:noFill/>
-          </a:ln>
           <a:solidFill>
             <a:schemeClr val="tx1"/>
           </a:solidFill>
@@ -6658,9 +6589,6 @@
         <a:buNone/>
         <a:tabLst/>
         <a:defRPr b="0" baseline="0" cap="none" i="0" spc="0" strike="noStrike" sz="2400" u="none">
-          <a:ln>
-            <a:noFill/>
-          </a:ln>
           <a:solidFill>
             <a:schemeClr val="tx1"/>
           </a:solidFill>
@@ -6687,9 +6615,6 @@
         <a:buNone/>
         <a:tabLst/>
         <a:defRPr b="0" baseline="0" cap="none" i="0" spc="0" strike="noStrike" sz="2400" u="none">
-          <a:ln>
-            <a:noFill/>
-          </a:ln>
           <a:solidFill>
             <a:schemeClr val="tx1"/>
           </a:solidFill>
@@ -7160,15 +7085,15 @@
           <a:blip r:embed="rId3">
             <a:extLst/>
           </a:blip>
-          <a:srcRect l="6091" t="12761" r="6430" b="12904"/>
+          <a:srcRect l="6091" t="12761" r="6429" b="12902"/>
           <a:stretch>
             <a:fillRect/>
           </a:stretch>
         </p:blipFill>
         <p:spPr>
           <a:xfrm>
-            <a:off x="3211983" y="2086243"/>
-            <a:ext cx="6555607" cy="5570543"/>
+            <a:off x="919470" y="606539"/>
+            <a:ext cx="4975642" cy="4228122"/>
           </a:xfrm>
           <a:custGeom>
             <a:avLst/>
@@ -7201,58 +7126,58 @@
                 </a:cubicBezTo>
                 <a:cubicBezTo>
                   <a:pt x="-1" y="4013"/>
-                  <a:pt x="1185" y="4917"/>
-                  <a:pt x="2635" y="6000"/>
+                  <a:pt x="1185" y="4918"/>
+                  <a:pt x="2635" y="6001"/>
                 </a:cubicBezTo>
                 <a:cubicBezTo>
-                  <a:pt x="4086" y="7083"/>
-                  <a:pt x="5283" y="8004"/>
-                  <a:pt x="5295" y="8047"/>
+                  <a:pt x="4085" y="7084"/>
+                  <a:pt x="5284" y="8004"/>
+                  <a:pt x="5296" y="8047"/>
                 </a:cubicBezTo>
                 <a:cubicBezTo>
-                  <a:pt x="5307" y="8090"/>
-                  <a:pt x="4120" y="9023"/>
-                  <a:pt x="2656" y="10119"/>
+                  <a:pt x="5308" y="8090"/>
+                  <a:pt x="4120" y="9022"/>
+                  <a:pt x="2656" y="10118"/>
                 </a:cubicBezTo>
                 <a:cubicBezTo>
-                  <a:pt x="1192" y="11215"/>
-                  <a:pt x="18" y="12142"/>
-                  <a:pt x="49" y="12178"/>
+                  <a:pt x="1192" y="11214"/>
+                  <a:pt x="18" y="12140"/>
+                  <a:pt x="48" y="12176"/>
                 </a:cubicBezTo>
                 <a:cubicBezTo>
-                  <a:pt x="79" y="12214"/>
-                  <a:pt x="1285" y="13124"/>
-                  <a:pt x="2727" y="14203"/>
+                  <a:pt x="79" y="12212"/>
+                  <a:pt x="1284" y="13124"/>
+                  <a:pt x="2726" y="14202"/>
                 </a:cubicBezTo>
                 <a:cubicBezTo>
                   <a:pt x="4169" y="15281"/>
-                  <a:pt x="5360" y="16167"/>
-                  <a:pt x="5374" y="16169"/>
+                  <a:pt x="5359" y="16166"/>
+                  <a:pt x="5373" y="16168"/>
                 </a:cubicBezTo>
                 <a:cubicBezTo>
-                  <a:pt x="5388" y="16171"/>
-                  <a:pt x="6609" y="15267"/>
-                  <a:pt x="8087" y="14161"/>
+                  <a:pt x="5387" y="16169"/>
+                  <a:pt x="6609" y="15266"/>
+                  <a:pt x="8087" y="14160"/>
                 </a:cubicBezTo>
                 <a:cubicBezTo>
-                  <a:pt x="9605" y="13026"/>
-                  <a:pt x="10816" y="12169"/>
-                  <a:pt x="10870" y="12193"/>
+                  <a:pt x="9605" y="13024"/>
+                  <a:pt x="10816" y="12168"/>
+                  <a:pt x="10870" y="12192"/>
                 </a:cubicBezTo>
                 <a:cubicBezTo>
-                  <a:pt x="10923" y="12217"/>
-                  <a:pt x="12152" y="13124"/>
-                  <a:pt x="13599" y="14209"/>
+                  <a:pt x="10923" y="12216"/>
+                  <a:pt x="12151" y="13123"/>
+                  <a:pt x="13598" y="14208"/>
                 </a:cubicBezTo>
                 <a:lnTo>
-                  <a:pt x="16230" y="16183"/>
+                  <a:pt x="16230" y="16182"/>
                 </a:lnTo>
                 <a:lnTo>
-                  <a:pt x="16517" y="15978"/>
+                  <a:pt x="16517" y="15977"/>
                 </a:lnTo>
                 <a:cubicBezTo>
-                  <a:pt x="17652" y="15173"/>
-                  <a:pt x="21560" y="12190"/>
+                  <a:pt x="17653" y="15172"/>
+                  <a:pt x="21559" y="12190"/>
                   <a:pt x="21558" y="12130"/>
                 </a:cubicBezTo>
                 <a:cubicBezTo>
@@ -7261,52 +7186,52 @@
                   <a:pt x="19014" y="10148"/>
                 </a:cubicBezTo>
                 <a:cubicBezTo>
-                  <a:pt x="17616" y="9100"/>
-                  <a:pt x="16429" y="8191"/>
-                  <a:pt x="16378" y="8131"/>
+                  <a:pt x="17615" y="9099"/>
+                  <a:pt x="16429" y="8192"/>
+                  <a:pt x="16378" y="8132"/>
                 </a:cubicBezTo>
                 <a:cubicBezTo>
-                  <a:pt x="16300" y="8040"/>
-                  <a:pt x="16453" y="7897"/>
-                  <a:pt x="17361" y="7219"/>
+                  <a:pt x="16300" y="8041"/>
+                  <a:pt x="16454" y="7896"/>
+                  <a:pt x="17361" y="7217"/>
                 </a:cubicBezTo>
                 <a:cubicBezTo>
-                  <a:pt x="20594" y="4802"/>
-                  <a:pt x="21577" y="4057"/>
-                  <a:pt x="21591" y="4006"/>
+                  <a:pt x="20594" y="4801"/>
+                  <a:pt x="21577" y="4058"/>
+                  <a:pt x="21591" y="4007"/>
                 </a:cubicBezTo>
                 <a:cubicBezTo>
-                  <a:pt x="21599" y="3976"/>
-                  <a:pt x="20970" y="3478"/>
-                  <a:pt x="20193" y="2899"/>
+                  <a:pt x="21599" y="3977"/>
+                  <a:pt x="20971" y="3477"/>
+                  <a:pt x="20194" y="2898"/>
                 </a:cubicBezTo>
                 <a:cubicBezTo>
-                  <a:pt x="19416" y="2320"/>
-                  <a:pt x="18218" y="1423"/>
-                  <a:pt x="17531" y="908"/>
+                  <a:pt x="19417" y="2319"/>
+                  <a:pt x="18217" y="1424"/>
+                  <a:pt x="17530" y="909"/>
                 </a:cubicBezTo>
                 <a:cubicBezTo>
-                  <a:pt x="16844" y="392"/>
-                  <a:pt x="16240" y="-10"/>
+                  <a:pt x="16843" y="393"/>
+                  <a:pt x="16239" y="-10"/>
                   <a:pt x="16187" y="14"/>
                 </a:cubicBezTo>
                 <a:cubicBezTo>
-                  <a:pt x="16135" y="37"/>
-                  <a:pt x="14908" y="944"/>
+                  <a:pt x="16134" y="38"/>
+                  <a:pt x="14909" y="944"/>
                   <a:pt x="13462" y="2026"/>
                 </a:cubicBezTo>
                 <a:cubicBezTo>
                   <a:pt x="11254" y="3678"/>
-                  <a:pt x="10810" y="3978"/>
-                  <a:pt x="10700" y="3910"/>
+                  <a:pt x="10809" y="3977"/>
+                  <a:pt x="10700" y="3908"/>
                 </a:cubicBezTo>
                 <a:cubicBezTo>
-                  <a:pt x="10628" y="3864"/>
-                  <a:pt x="9414" y="2962"/>
-                  <a:pt x="8000" y="1903"/>
+                  <a:pt x="10628" y="3863"/>
+                  <a:pt x="9414" y="2961"/>
+                  <a:pt x="8000" y="1902"/>
                 </a:cubicBezTo>
                 <a:cubicBezTo>
-                  <a:pt x="6586" y="844"/>
+                  <a:pt x="6586" y="843"/>
                   <a:pt x="5394" y="-13"/>
                   <a:pt x="5351" y="0"/>
                 </a:cubicBezTo>
@@ -7315,111 +7240,140 @@
                   <a:pt x="10803" y="3997"/>
                 </a:moveTo>
                 <a:lnTo>
-                  <a:pt x="11007" y="4143"/>
+                  <a:pt x="11008" y="4143"/>
                 </a:lnTo>
                 <a:cubicBezTo>
-                  <a:pt x="11120" y="4222"/>
-                  <a:pt x="12275" y="5081"/>
-                  <a:pt x="13573" y="6053"/>
+                  <a:pt x="11121" y="4222"/>
+                  <a:pt x="12274" y="5082"/>
+                  <a:pt x="13572" y="6054"/>
                 </a:cubicBezTo>
                 <a:cubicBezTo>
-                  <a:pt x="14871" y="7024"/>
-                  <a:pt x="15999" y="7862"/>
-                  <a:pt x="16080" y="7913"/>
+                  <a:pt x="14871" y="7025"/>
+                  <a:pt x="15999" y="7861"/>
+                  <a:pt x="16080" y="7912"/>
                 </a:cubicBezTo>
                 <a:cubicBezTo>
-                  <a:pt x="16161" y="7964"/>
-                  <a:pt x="16211" y="8039"/>
-                  <a:pt x="16190" y="8079"/>
+                  <a:pt x="16161" y="7963"/>
+                  <a:pt x="16211" y="8038"/>
+                  <a:pt x="16190" y="8078"/>
                 </a:cubicBezTo>
                 <a:cubicBezTo>
-                  <a:pt x="16169" y="8119"/>
+                  <a:pt x="16169" y="8118"/>
                   <a:pt x="15102" y="8934"/>
-                  <a:pt x="13819" y="9892"/>
+                  <a:pt x="13819" y="9891"/>
                 </a:cubicBezTo>
                 <a:cubicBezTo>
-                  <a:pt x="12536" y="10849"/>
-                  <a:pt x="11332" y="11748"/>
+                  <a:pt x="12536" y="10848"/>
+                  <a:pt x="11332" y="11747"/>
                   <a:pt x="11144" y="11887"/>
                 </a:cubicBezTo>
                 <a:lnTo>
-                  <a:pt x="10803" y="12141"/>
+                  <a:pt x="10803" y="12140"/>
                 </a:lnTo>
                 <a:lnTo>
-                  <a:pt x="8143" y="10147"/>
+                  <a:pt x="8144" y="10146"/>
                 </a:lnTo>
                 <a:cubicBezTo>
-                  <a:pt x="6681" y="9050"/>
+                  <a:pt x="6682" y="9049"/>
                   <a:pt x="5485" y="8113"/>
                   <a:pt x="5485" y="8064"/>
                 </a:cubicBezTo>
                 <a:cubicBezTo>
                   <a:pt x="5485" y="8014"/>
-                  <a:pt x="6681" y="7079"/>
-                  <a:pt x="8143" y="5987"/>
+                  <a:pt x="6682" y="7080"/>
+                  <a:pt x="8144" y="5987"/>
                 </a:cubicBezTo>
                 <a:lnTo>
                   <a:pt x="10803" y="3997"/>
                 </a:lnTo>
                 <a:close/>
                 <a:moveTo>
-                  <a:pt x="10811" y="13527"/>
+                  <a:pt x="10812" y="13526"/>
                 </a:moveTo>
                 <a:cubicBezTo>
-                  <a:pt x="10788" y="13527"/>
-                  <a:pt x="9995" y="14107"/>
-                  <a:pt x="9048" y="14817"/>
+                  <a:pt x="10788" y="13526"/>
+                  <a:pt x="9995" y="14108"/>
+                  <a:pt x="9048" y="14818"/>
                 </a:cubicBezTo>
                 <a:cubicBezTo>
-                  <a:pt x="8101" y="15527"/>
-                  <a:pt x="6905" y="16419"/>
-                  <a:pt x="6391" y="16800"/>
+                  <a:pt x="8102" y="15527"/>
+                  <a:pt x="6905" y="16418"/>
+                  <a:pt x="6391" y="16799"/>
                 </a:cubicBezTo>
                 <a:cubicBezTo>
-                  <a:pt x="5876" y="17181"/>
-                  <a:pt x="5455" y="17515"/>
-                  <a:pt x="5453" y="17541"/>
+                  <a:pt x="5877" y="17180"/>
+                  <a:pt x="5456" y="17514"/>
+                  <a:pt x="5454" y="17540"/>
                 </a:cubicBezTo>
                 <a:cubicBezTo>
-                  <a:pt x="5452" y="17567"/>
-                  <a:pt x="6408" y="18306"/>
+                  <a:pt x="5453" y="17566"/>
+                  <a:pt x="6409" y="18306"/>
                   <a:pt x="7579" y="19183"/>
                 </a:cubicBezTo>
                 <a:cubicBezTo>
-                  <a:pt x="8749" y="20060"/>
-                  <a:pt x="9953" y="20964"/>
-                  <a:pt x="10253" y="21192"/>
+                  <a:pt x="8750" y="20061"/>
+                  <a:pt x="9952" y="20965"/>
+                  <a:pt x="10252" y="21193"/>
                 </a:cubicBezTo>
                 <a:cubicBezTo>
-                  <a:pt x="10553" y="21421"/>
+                  <a:pt x="10552" y="21422"/>
                   <a:pt x="10830" y="21587"/>
                   <a:pt x="10869" y="21560"/>
                 </a:cubicBezTo>
                 <a:cubicBezTo>
                   <a:pt x="10908" y="21532"/>
-                  <a:pt x="11997" y="20717"/>
-                  <a:pt x="13291" y="19748"/>
+                  <a:pt x="11998" y="20717"/>
+                  <a:pt x="13292" y="19748"/>
                 </a:cubicBezTo>
                 <a:cubicBezTo>
-                  <a:pt x="14584" y="18780"/>
-                  <a:pt x="15775" y="17887"/>
-                  <a:pt x="15936" y="17767"/>
+                  <a:pt x="14585" y="18779"/>
+                  <a:pt x="15776" y="17887"/>
+                  <a:pt x="15937" y="17767"/>
                 </a:cubicBezTo>
                 <a:lnTo>
-                  <a:pt x="16229" y="17550"/>
+                  <a:pt x="16228" y="17548"/>
                 </a:lnTo>
                 <a:lnTo>
-                  <a:pt x="13542" y="15538"/>
+                  <a:pt x="13541" y="15538"/>
                 </a:lnTo>
                 <a:cubicBezTo>
-                  <a:pt x="12064" y="14431"/>
-                  <a:pt x="10835" y="13527"/>
-                  <a:pt x="10811" y="13527"/>
+                  <a:pt x="12063" y="14432"/>
+                  <a:pt x="10835" y="13526"/>
+                  <a:pt x="10812" y="13526"/>
                 </a:cubicBezTo>
                 <a:close/>
               </a:path>
             </a:pathLst>
           </a:custGeom>
+        </p:spPr>
+      </p:pic>
+      <p:pic>
+        <p:nvPicPr>
+          <p:cNvPr id="224" name="220px-1password2018.png" descr="220px-1password2018.png"/>
+          <p:cNvPicPr>
+            <a:picLocks noChangeAspect="1"/>
+          </p:cNvPicPr>
+          <p:nvPr/>
+        </p:nvPicPr>
+        <p:blipFill>
+          <a:blip r:embed="rId4">
+            <a:extLst/>
+          </a:blip>
+          <a:stretch>
+            <a:fillRect/>
+          </a:stretch>
+        </p:blipFill>
+        <p:spPr>
+          <a:xfrm>
+            <a:off x="7193412" y="4400194"/>
+            <a:ext cx="4975642" cy="4975641"/>
+          </a:xfrm>
+          <a:prstGeom prst="rect">
+            <a:avLst/>
+          </a:prstGeom>
+          <a:ln w="12700">
+            <a:miter lim="400000"/>
+          </a:ln>
         </p:spPr>
       </p:pic>
     </p:spTree>
@@ -7457,7 +7411,7 @@
       </p:grpSpPr>
       <p:pic>
         <p:nvPicPr>
-          <p:cNvPr id="227" name="hero-on-white-4x3.png" descr="hero-on-white-4x3.png"/>
+          <p:cNvPr id="228" name="hero-on-white-4x3.png" descr="hero-on-white-4x3.png"/>
           <p:cNvPicPr>
             <a:picLocks noChangeAspect="1"/>
           </p:cNvPicPr>
@@ -7486,7 +7440,7 @@
       </p:pic>
       <p:pic>
         <p:nvPicPr>
-          <p:cNvPr id="228" name="unnamed.png" descr="unnamed.png"/>
+          <p:cNvPr id="229" name="unnamed.png" descr="unnamed.png"/>
           <p:cNvPicPr>
             <a:picLocks noChangeAspect="1"/>
           </p:cNvPicPr>
@@ -7515,7 +7469,7 @@
       </p:pic>
       <p:pic>
         <p:nvPicPr>
-          <p:cNvPr id="229" name="YubiKey-5-NFC.png" descr="YubiKey-5-NFC.png"/>
+          <p:cNvPr id="230" name="YubiKey-5-NFC.png" descr="YubiKey-5-NFC.png"/>
           <p:cNvPicPr>
             <a:picLocks noChangeAspect="1"/>
           </p:cNvPicPr>
@@ -7544,7 +7498,7 @@
       </p:pic>
       <p:pic>
         <p:nvPicPr>
-          <p:cNvPr id="230" name="Security-Key-by-Yubico-nl-opt.png" descr="Security-Key-by-Yubico-nl-opt.png"/>
+          <p:cNvPr id="231" name="Security-Key-by-Yubico-nl-opt.png" descr="Security-Key-by-Yubico-nl-opt.png"/>
           <p:cNvPicPr>
             <a:picLocks noChangeAspect="1"/>
           </p:cNvPicPr>
@@ -7599,7 +7553,7 @@
       </p:grpSpPr>
       <p:pic>
         <p:nvPicPr>
-          <p:cNvPr id="234" name="how-to-teach-child-about-asymmetric-cryptography.png" descr="how-to-teach-child-about-asymmetric-cryptography.png"/>
+          <p:cNvPr id="235" name="how-to-teach-child-about-asymmetric-cryptography.png" descr="how-to-teach-child-about-asymmetric-cryptography.png"/>
           <p:cNvPicPr>
             <a:picLocks noChangeAspect="1"/>
           </p:cNvPicPr>
@@ -7661,7 +7615,7 @@
       </p:grpSpPr>
       <p:pic>
         <p:nvPicPr>
-          <p:cNvPr id="238" name="WebAuthn_Registration_r4.png" descr="WebAuthn_Registration_r4.png"/>
+          <p:cNvPr id="239" name="WebAuthn_Registration_r4.png" descr="WebAuthn_Registration_r4.png"/>
           <p:cNvPicPr>
             <a:picLocks noChangeAspect="0"/>
           </p:cNvPicPr>
@@ -7723,7 +7677,7 @@
       </p:grpSpPr>
       <p:pic>
         <p:nvPicPr>
-          <p:cNvPr id="242" name="MDN Webauthn Authentication (r1).png" descr="MDN Webauthn Authentication (r1).png"/>
+          <p:cNvPr id="243" name="MDN Webauthn Authentication (r1).png" descr="MDN Webauthn Authentication (r1).png"/>
           <p:cNvPicPr>
             <a:picLocks noChangeAspect="0"/>
           </p:cNvPicPr>
@@ -7833,7 +7787,7 @@
       </p:grpSpPr>
       <p:pic>
         <p:nvPicPr>
-          <p:cNvPr id="246" name="images.jpg" descr="images.jpg"/>
+          <p:cNvPr id="247" name="images.jpg" descr="images.jpg"/>
           <p:cNvPicPr>
             <a:picLocks noChangeAspect="1"/>
           </p:cNvPicPr>
@@ -7888,7 +7842,7 @@
       </p:grpSpPr>
       <p:sp>
         <p:nvSpPr>
-          <p:cNvPr id="250" name="passwords ?"/>
+          <p:cNvPr id="251" name="passwords ?"/>
           <p:cNvSpPr txBox="1"/>
           <p:nvPr>
             <p:ph type="title"/>
@@ -7916,7 +7870,7 @@
       </p:sp>
       <p:pic>
         <p:nvPicPr>
-          <p:cNvPr id="251" name="giphy.mp4" descr="giphy.mp4"/>
+          <p:cNvPr id="252" name="giphy.mp4" descr="giphy.mp4"/>
           <p:cNvPicPr>
             <a:picLocks noChangeAspect="0"/>
           </p:cNvPicPr>
@@ -7989,7 +7943,7 @@
                                       <p:cBhvr>
                                         <p:cTn id="6" dur="4099999" fill="hold"/>
                                         <p:tgtEl>
-                                          <p:spTgt spid="251"/>
+                                          <p:spTgt spid="252"/>
                                         </p:tgtEl>
                                       </p:cBhvr>
                                     </p:cmd>
@@ -8027,7 +7981,7 @@
                   </p:stCondLst>
                 </p:cTn>
                 <p:tgtEl>
-                  <p:spTgt spid="251"/>
+                  <p:spTgt spid="252"/>
                 </p:tgtEl>
               </p:cMediaNode>
             </p:video>
@@ -8058,7 +8012,7 @@
       </p:grpSpPr>
       <p:pic>
         <p:nvPicPr>
-          <p:cNvPr id="255" name="4904217654_2767e889e0.jpg" descr="4904217654_2767e889e0.jpg"/>
+          <p:cNvPr id="256" name="4904217654_2767e889e0.jpg" descr="4904217654_2767e889e0.jpg"/>
           <p:cNvPicPr>
             <a:picLocks noChangeAspect="1"/>
           </p:cNvPicPr>
@@ -8113,7 +8067,7 @@
       </p:grpSpPr>
       <p:sp>
         <p:nvSpPr>
-          <p:cNvPr id="259" name="Références"/>
+          <p:cNvPr id="260" name="Références"/>
           <p:cNvSpPr txBox="1"/>
           <p:nvPr>
             <p:ph type="body" idx="13"/>
@@ -8137,7 +8091,7 @@
       </p:sp>
       <p:sp>
         <p:nvSpPr>
-          <p:cNvPr id="260" name="Spécification =&gt; https://www.w3.org/TR/webauthn/…"/>
+          <p:cNvPr id="261" name="Spécification =&gt; https://www.w3.org/TR/webauthn/…"/>
           <p:cNvSpPr txBox="1"/>
           <p:nvPr>
             <p:ph type="body" idx="1"/>

</xml_diff>

<commit_message>
🔗 Add link on SIM swapping ring
</commit_message>
<xml_diff>
--- a/WebAuthn.pptx
+++ b/WebAuthn.pptx
@@ -2453,6 +2453,24 @@
               <a:t>D’ailleurs le code envoyé par SMS pour valider ces achats en ligne doit être remplacé d’ici la fin d’année.</a:t>
             </a:r>
           </a:p>
+          <a:p>
+            <a:pPr/>
+            <a:r>
+              <a:t>Par exemple récemment aux Etats-Unis un gang a été arrêté après avoir extorqué plus de 2 millions de dollars à leurs victimes en utilisant la technique du SIM swapping (</a:t>
+            </a:r>
+            <a:r>
+              <a:rPr u="sng">
+                <a:solidFill>
+                  <a:schemeClr val="accent1"/>
+                </a:solidFill>
+                <a:hlinkClick r:id="rId3" invalidUrl="" action="" tgtFrame="" tooltip="" history="1" highlightClick="0" endSnd="0"/>
+              </a:rPr>
+              <a:t>https://krebsonsecurity.com/2019/05/nine-charged-in-alleged-sim-swapping-ring/</a:t>
+            </a:r>
+            <a:r>
+              <a:t>).</a:t>
+            </a:r>
+          </a:p>
         </p:txBody>
       </p:sp>
     </p:spTree>
@@ -6119,7 +6137,7 @@
       </a:lvl9pPr>
     </p:titleStyle>
     <p:bodyStyle>
-      <a:lvl1pPr marL="444500" marR="0" indent="-444500" algn="l" defTabSz="584200" latinLnBrk="0">
+      <a:lvl1pPr marL="444500" marR="0" indent="-444500" algn="l" defTabSz="584200" rtl="0" latinLnBrk="0">
         <a:lnSpc>
           <a:spcPct val="100000"/>
         </a:lnSpc>
@@ -6149,7 +6167,7 @@
           <a:sym typeface="Avenir Next Medium"/>
         </a:defRPr>
       </a:lvl1pPr>
-      <a:lvl2pPr marL="889000" marR="0" indent="-444500" algn="l" defTabSz="584200" latinLnBrk="0">
+      <a:lvl2pPr marL="889000" marR="0" indent="-444500" algn="l" defTabSz="584200" rtl="0" latinLnBrk="0">
         <a:lnSpc>
           <a:spcPct val="100000"/>
         </a:lnSpc>
@@ -6179,7 +6197,7 @@
           <a:sym typeface="Avenir Next Medium"/>
         </a:defRPr>
       </a:lvl2pPr>
-      <a:lvl3pPr marL="1333500" marR="0" indent="-444500" algn="l" defTabSz="584200" latinLnBrk="0">
+      <a:lvl3pPr marL="1333500" marR="0" indent="-444500" algn="l" defTabSz="584200" rtl="0" latinLnBrk="0">
         <a:lnSpc>
           <a:spcPct val="100000"/>
         </a:lnSpc>
@@ -6209,7 +6227,7 @@
           <a:sym typeface="Avenir Next Medium"/>
         </a:defRPr>
       </a:lvl3pPr>
-      <a:lvl4pPr marL="1778000" marR="0" indent="-444500" algn="l" defTabSz="584200" latinLnBrk="0">
+      <a:lvl4pPr marL="1778000" marR="0" indent="-444500" algn="l" defTabSz="584200" rtl="0" latinLnBrk="0">
         <a:lnSpc>
           <a:spcPct val="100000"/>
         </a:lnSpc>
@@ -6239,7 +6257,7 @@
           <a:sym typeface="Avenir Next Medium"/>
         </a:defRPr>
       </a:lvl4pPr>
-      <a:lvl5pPr marL="2222500" marR="0" indent="-444500" algn="l" defTabSz="584200" latinLnBrk="0">
+      <a:lvl5pPr marL="2222500" marR="0" indent="-444500" algn="l" defTabSz="584200" rtl="0" latinLnBrk="0">
         <a:lnSpc>
           <a:spcPct val="100000"/>
         </a:lnSpc>
@@ -6269,7 +6287,7 @@
           <a:sym typeface="Avenir Next Medium"/>
         </a:defRPr>
       </a:lvl5pPr>
-      <a:lvl6pPr marL="2667000" marR="0" indent="-444500" algn="l" defTabSz="584200" latinLnBrk="0">
+      <a:lvl6pPr marL="2667000" marR="0" indent="-444500" algn="l" defTabSz="584200" rtl="0" latinLnBrk="0">
         <a:lnSpc>
           <a:spcPct val="100000"/>
         </a:lnSpc>
@@ -6299,7 +6317,7 @@
           <a:sym typeface="Avenir Next Medium"/>
         </a:defRPr>
       </a:lvl6pPr>
-      <a:lvl7pPr marL="3111500" marR="0" indent="-444500" algn="l" defTabSz="584200" latinLnBrk="0">
+      <a:lvl7pPr marL="3111500" marR="0" indent="-444500" algn="l" defTabSz="584200" rtl="0" latinLnBrk="0">
         <a:lnSpc>
           <a:spcPct val="100000"/>
         </a:lnSpc>
@@ -6329,7 +6347,7 @@
           <a:sym typeface="Avenir Next Medium"/>
         </a:defRPr>
       </a:lvl7pPr>
-      <a:lvl8pPr marL="3556000" marR="0" indent="-444500" algn="l" defTabSz="584200" latinLnBrk="0">
+      <a:lvl8pPr marL="3556000" marR="0" indent="-444500" algn="l" defTabSz="584200" rtl="0" latinLnBrk="0">
         <a:lnSpc>
           <a:spcPct val="100000"/>
         </a:lnSpc>
@@ -6359,7 +6377,7 @@
           <a:sym typeface="Avenir Next Medium"/>
         </a:defRPr>
       </a:lvl8pPr>
-      <a:lvl9pPr marL="4000500" marR="0" indent="-444500" algn="l" defTabSz="584200" latinLnBrk="0">
+      <a:lvl9pPr marL="4000500" marR="0" indent="-444500" algn="l" defTabSz="584200" rtl="0" latinLnBrk="0">
         <a:lnSpc>
           <a:spcPct val="100000"/>
         </a:lnSpc>
@@ -7141,7 +7159,7 @@
                 </a:cubicBezTo>
                 <a:cubicBezTo>
                   <a:pt x="1192" y="11214"/>
-                  <a:pt x="18" y="12140"/>
+                  <a:pt x="18" y="12141"/>
                   <a:pt x="48" y="12176"/>
                 </a:cubicBezTo>
                 <a:cubicBezTo>
@@ -7365,8 +7383,8 @@
         </p:blipFill>
         <p:spPr>
           <a:xfrm>
-            <a:off x="7193412" y="4400194"/>
-            <a:ext cx="4975642" cy="4975641"/>
+            <a:off x="7193412" y="4400193"/>
+            <a:ext cx="4975641" cy="4975642"/>
           </a:xfrm>
           <a:prstGeom prst="rect">
             <a:avLst/>

</xml_diff>